<commit_message>
Replaced with non-version specific terms
</commit_message>
<xml_diff>
--- a/Presentation/2_Revit_UI_API.pptx
+++ b/Presentation/2_Revit_UI_API.pptx
@@ -207,7 +207,7 @@
 
 <file path=ppt/commentAuthors.xml><?xml version="1.0" encoding="utf-8"?>
 <p:cmAuthorLst xmlns:a="http://schemas.openxmlformats.org/drawingml/2006/main" xmlns:r="http://schemas.openxmlformats.org/officeDocument/2006/relationships" xmlns:p="http://schemas.openxmlformats.org/presentationml/2006/main">
-  <p:cmAuthor id="1" name="Author" initials="A" lastIdx="3" clrIdx="1"/>
+  <p:cmAuthor id="2" name="作成者" initials="A" lastIdx="0" clrIdx="2"/>
 </p:cmAuthorLst>
 </file>
 
@@ -322,7 +322,7 @@
               <a:pPr>
                 <a:defRPr/>
               </a:pPr>
-              <a:t>3/10/2015</a:t>
+              <a:t>7/14/2016</a:t>
             </a:fld>
             <a:endParaRPr lang="en-US"/>
           </a:p>
@@ -545,7 +545,7 @@
               <a:pPr>
                 <a:defRPr/>
               </a:pPr>
-              <a:t>3/10/2015</a:t>
+              <a:t>7/14/2016</a:t>
             </a:fld>
             <a:endParaRPr lang="en-US"/>
           </a:p>
@@ -18966,14 +18966,22 @@
               <a:defRPr/>
             </a:pPr>
             <a:r>
+              <a:rPr lang="en-GB" sz="2000" noProof="1">
+                <a:hlinkClick r:id="rId4"/>
+              </a:rPr>
+              <a:t>http</a:t>
+            </a:r>
+            <a:r>
+              <a:rPr lang="en-GB" sz="2000" noProof="1">
+                <a:hlinkClick r:id="rId4"/>
+              </a:rPr>
+              <a:t>://</a:t>
+            </a:r>
+            <a:r>
               <a:rPr lang="en-GB" sz="2000" noProof="1" smtClean="0">
                 <a:hlinkClick r:id="rId4"/>
               </a:rPr>
-              <a:t>http://discussion.autodesk.com</a:t>
-            </a:r>
-            <a:r>
-              <a:rPr lang="en-US" sz="2000" noProof="1" smtClean="0"/>
-              <a:t> &gt; Revit Architecture &gt; Revit API</a:t>
+              <a:t>forums.autodesk.com/t5/revit-api/bd-p/160</a:t>
             </a:r>
             <a:endParaRPr lang="en-GB" sz="2000" dirty="0" smtClean="0"/>
           </a:p>
@@ -18993,13 +19001,19 @@
             </a:pPr>
             <a:r>
               <a:rPr lang="en-GB" sz="2000" noProof="1" smtClean="0">
-                <a:hlinkClick r:id="rId4"/>
-              </a:rPr>
-              <a:t>http://</a:t>
+                <a:hlinkClick r:id="rId5"/>
+              </a:rPr>
+              <a:t>http</a:t>
             </a:r>
             <a:r>
               <a:rPr lang="en-GB" sz="2000" noProof="1" smtClean="0">
                 <a:hlinkClick r:id="rId5"/>
+              </a:rPr>
+              <a:t>://</a:t>
+            </a:r>
+            <a:r>
+              <a:rPr lang="en-GB" sz="2000" noProof="1" smtClean="0">
+                <a:hlinkClick r:id="rId6"/>
               </a:rPr>
               <a:t>www.autodesk.com/apitraining</a:t>
             </a:r>
@@ -19042,7 +19056,7 @@
             </a:pPr>
             <a:r>
               <a:rPr lang="en-GB" sz="2000" noProof="1" smtClean="0">
-                <a:hlinkClick r:id="rId6"/>
+                <a:hlinkClick r:id="rId7"/>
               </a:rPr>
               <a:t>http://thebuildingcoder.typepad.com</a:t>
             </a:r>
@@ -19073,19 +19087,19 @@
             </a:pPr>
             <a:r>
               <a:rPr lang="en-US" sz="2000" dirty="0" smtClean="0">
-                <a:hlinkClick r:id="rId7"/>
+                <a:hlinkClick r:id="rId8"/>
               </a:rPr>
               <a:t>http</a:t>
             </a:r>
             <a:r>
               <a:rPr lang="en-US" sz="2000" dirty="0">
-                <a:hlinkClick r:id="rId7"/>
+                <a:hlinkClick r:id="rId8"/>
               </a:rPr>
               <a:t>://</a:t>
             </a:r>
             <a:r>
               <a:rPr lang="en-US" sz="2000" dirty="0" smtClean="0">
-                <a:hlinkClick r:id="rId7"/>
+                <a:hlinkClick r:id="rId8"/>
               </a:rPr>
               <a:t>adndevblog.typepad.com/aec/</a:t>
             </a:r>
@@ -19113,13 +19127,13 @@
             </a:pPr>
             <a:r>
               <a:rPr lang="en-US" sz="2000" dirty="0">
-                <a:hlinkClick r:id="rId8"/>
+                <a:hlinkClick r:id="rId9"/>
               </a:rPr>
               <a:t>http://www.autodesk.com/revit-help/?</a:t>
             </a:r>
             <a:r>
               <a:rPr lang="en-US" sz="2000" dirty="0" smtClean="0">
-                <a:hlinkClick r:id="rId8"/>
+                <a:hlinkClick r:id="rId9"/>
               </a:rPr>
               <a:t>guid=GUID-F0A122E0-E556-4D0D-9D0F-7E72A9315A42</a:t>
             </a:r>
@@ -19141,25 +19155,19 @@
             </a:pPr>
             <a:r>
               <a:rPr lang="en-GB" sz="2000" noProof="1" smtClean="0">
-                <a:hlinkClick r:id="rId4"/>
-              </a:rPr>
-              <a:t>http</a:t>
+                <a:hlinkClick r:id="rId5"/>
+              </a:rPr>
+              <a:t>http://</a:t>
             </a:r>
             <a:r>
               <a:rPr lang="en-GB" sz="2000" noProof="1" smtClean="0">
-                <a:hlinkClick r:id="rId4"/>
-              </a:rPr>
-              <a:t>://</a:t>
-            </a:r>
-            <a:r>
-              <a:rPr lang="en-GB" sz="2000" noProof="1" smtClean="0">
-                <a:hlinkClick r:id="rId9"/>
+                <a:hlinkClick r:id="rId10"/>
               </a:rPr>
               <a:t>www.autodesk.com/</a:t>
             </a:r>
             <a:r>
               <a:rPr lang="en-US" sz="2000" dirty="0" err="1" smtClean="0">
-                <a:hlinkClick r:id="rId9"/>
+                <a:hlinkClick r:id="rId10"/>
               </a:rPr>
               <a:t>joinadn</a:t>
             </a:r>
@@ -19190,7 +19198,7 @@
             </a:pPr>
             <a:r>
               <a:rPr lang="en-GB" sz="2000" noProof="1" smtClean="0">
-                <a:hlinkClick r:id="rId10"/>
+                <a:hlinkClick r:id="rId11"/>
               </a:rPr>
               <a:t>http://adn.autodesk.com</a:t>
             </a:r>
@@ -21436,30 +21444,6 @@
 </file>
 
 <file path=customXml/item1.xml><?xml version="1.0" encoding="utf-8"?>
-<?mso-contentType ?>
-<FormTemplates xmlns="http://schemas.microsoft.com/sharepoint/v3/contenttype/forms">
-  <Display>DocumentLibraryForm</Display>
-  <Edit>DocumentLibraryForm</Edit>
-  <New>DocumentLibraryForm</New>
-</FormTemplates>
-</file>
-
-<file path=customXml/item2.xml><?xml version="1.0" encoding="utf-8"?>
-<p:properties xmlns:p="http://schemas.microsoft.com/office/2006/metadata/properties" xmlns:xsi="http://www.w3.org/2001/XMLSchema-instance">
-  <documentManagement>
-    <Image xmlns="f53a3603-67ad-45e2-accf-d44f8756b321">
-      <Url>https://share.autodesk.com/Marketing/catalog/PublishingImages/09_25_08_AEC_Title_01.jpg</Url>
-      <Description xsi:nil="true"/>
-    </Image>
-    <Date_x0020_Published xmlns="c8bab806-ca78-4cad-94f6-48e563f76e95">2009-05-14T07:00:00+00:00</Date_x0020_Published>
-    <Media_x0020_Description xmlns="c8bab806-ca78-4cad-94f6-48e563f76e95">AEC Industry Title Slide -- General Overview Version</Media_x0020_Description>
-    <Category xmlns="f53a3603-67ad-45e2-accf-d44f8756b321" xsi:nil="true"/>
-    <Business_x0020_and_x0020_Industry xmlns="f53a3603-67ad-45e2-accf-d44f8756b321">Industry PowerPoint Title Slides</Business_x0020_and_x0020_Industry>
-  </documentManagement>
-</p:properties>
-</file>
-
-<file path=customXml/item3.xml><?xml version="1.0" encoding="utf-8"?>
 <ct:contentTypeSchema xmlns:ct="http://schemas.microsoft.com/office/2006/metadata/contentType" xmlns:ma="http://schemas.microsoft.com/office/2006/metadata/properties/metaAttributes" ct:_="" ma:_="" ma:contentTypeName="Creative Catalog" ma:contentTypeID="0x0101003D62B9A716C08244A68E1D56ED354A9500A7EFD4C2F324CA44B4E995A506E2E1CF" ma:contentTypeVersion="31" ma:contentTypeDescription="" ma:contentTypeScope="" ma:versionID="17bc19fc9bd490bc1bda444d86d6b7f0">
   <xsd:schema xmlns:xsd="http://www.w3.org/2001/XMLSchema" xmlns:p="http://schemas.microsoft.com/office/2006/metadata/properties" xmlns:ns2="c8bab806-ca78-4cad-94f6-48e563f76e95" xmlns:ns4="f53a3603-67ad-45e2-accf-d44f8756b321" targetNamespace="http://schemas.microsoft.com/office/2006/metadata/properties" ma:root="true" ma:fieldsID="284905265c583129f8035dc0f09dfb0f" ns2:_="" ns4:_="">
     <xsd:import namespace="c8bab806-ca78-4cad-94f6-48e563f76e95"/>
@@ -21558,10 +21542,44 @@
 </ct:contentTypeSchema>
 </file>
 
+<file path=customXml/item2.xml><?xml version="1.0" encoding="utf-8"?>
+<p:properties xmlns:p="http://schemas.microsoft.com/office/2006/metadata/properties" xmlns:xsi="http://www.w3.org/2001/XMLSchema-instance">
+  <documentManagement>
+    <Image xmlns="f53a3603-67ad-45e2-accf-d44f8756b321">
+      <Url>https://share.autodesk.com/Marketing/catalog/PublishingImages/09_25_08_AEC_Title_01.jpg</Url>
+      <Description xsi:nil="true"/>
+    </Image>
+    <Date_x0020_Published xmlns="c8bab806-ca78-4cad-94f6-48e563f76e95">2009-05-14T07:00:00+00:00</Date_x0020_Published>
+    <Media_x0020_Description xmlns="c8bab806-ca78-4cad-94f6-48e563f76e95">AEC Industry Title Slide -- General Overview Version</Media_x0020_Description>
+    <Category xmlns="f53a3603-67ad-45e2-accf-d44f8756b321" xsi:nil="true"/>
+    <Business_x0020_and_x0020_Industry xmlns="f53a3603-67ad-45e2-accf-d44f8756b321">Industry PowerPoint Title Slides</Business_x0020_and_x0020_Industry>
+  </documentManagement>
+</p:properties>
+</file>
+
+<file path=customXml/item3.xml><?xml version="1.0" encoding="utf-8"?>
+<?mso-contentType ?>
+<FormTemplates xmlns="http://schemas.microsoft.com/sharepoint/v3/contenttype/forms">
+  <Display>DocumentLibraryForm</Display>
+  <Edit>DocumentLibraryForm</Edit>
+  <New>DocumentLibraryForm</New>
+</FormTemplates>
+</file>
+
 <file path=customXml/itemProps1.xml><?xml version="1.0" encoding="utf-8"?>
-<ds:datastoreItem xmlns:ds="http://schemas.openxmlformats.org/officeDocument/2006/customXml" ds:itemID="{1B23F64D-CA4A-4BF5-9636-FF31814D07BC}">
+<ds:datastoreItem xmlns:ds="http://schemas.openxmlformats.org/officeDocument/2006/customXml" ds:itemID="{A9644739-F05B-4EE2-A361-57034C614130}">
   <ds:schemaRefs>
-    <ds:schemaRef ds:uri="http://schemas.microsoft.com/sharepoint/v3/contenttype/forms"/>
+    <ds:schemaRef ds:uri="http://schemas.microsoft.com/office/2006/metadata/contentType"/>
+    <ds:schemaRef ds:uri="http://schemas.microsoft.com/office/2006/metadata/properties/metaAttributes"/>
+    <ds:schemaRef ds:uri="http://www.w3.org/2001/XMLSchema"/>
+    <ds:schemaRef ds:uri="http://schemas.microsoft.com/office/2006/metadata/properties"/>
+    <ds:schemaRef ds:uri="c8bab806-ca78-4cad-94f6-48e563f76e95"/>
+    <ds:schemaRef ds:uri="f53a3603-67ad-45e2-accf-d44f8756b321"/>
+    <ds:schemaRef ds:uri="http://schemas.microsoft.com/office/2006/documentManagement/types"/>
+    <ds:schemaRef ds:uri="http://schemas.openxmlformats.org/package/2006/metadata/core-properties"/>
+    <ds:schemaRef ds:uri="http://purl.org/dc/elements/1.1/"/>
+    <ds:schemaRef ds:uri="http://purl.org/dc/terms/"/>
+    <ds:schemaRef ds:uri="http://schemas.microsoft.com/office/internal/2005/internalDocumentation"/>
   </ds:schemaRefs>
 </ds:datastoreItem>
 </file>
@@ -21577,19 +21595,9 @@
 </file>
 
 <file path=customXml/itemProps3.xml><?xml version="1.0" encoding="utf-8"?>
-<ds:datastoreItem xmlns:ds="http://schemas.openxmlformats.org/officeDocument/2006/customXml" ds:itemID="{A9644739-F05B-4EE2-A361-57034C614130}">
+<ds:datastoreItem xmlns:ds="http://schemas.openxmlformats.org/officeDocument/2006/customXml" ds:itemID="{1B23F64D-CA4A-4BF5-9636-FF31814D07BC}">
   <ds:schemaRefs>
-    <ds:schemaRef ds:uri="http://schemas.microsoft.com/office/2006/metadata/contentType"/>
-    <ds:schemaRef ds:uri="http://schemas.microsoft.com/office/2006/metadata/properties/metaAttributes"/>
-    <ds:schemaRef ds:uri="http://www.w3.org/2001/XMLSchema"/>
-    <ds:schemaRef ds:uri="http://schemas.microsoft.com/office/2006/metadata/properties"/>
-    <ds:schemaRef ds:uri="c8bab806-ca78-4cad-94f6-48e563f76e95"/>
-    <ds:schemaRef ds:uri="f53a3603-67ad-45e2-accf-d44f8756b321"/>
-    <ds:schemaRef ds:uri="http://schemas.microsoft.com/office/2006/documentManagement/types"/>
-    <ds:schemaRef ds:uri="http://schemas.openxmlformats.org/package/2006/metadata/core-properties"/>
-    <ds:schemaRef ds:uri="http://purl.org/dc/elements/1.1/"/>
-    <ds:schemaRef ds:uri="http://purl.org/dc/terms/"/>
-    <ds:schemaRef ds:uri="http://schemas.microsoft.com/office/internal/2005/internalDocumentation"/>
+    <ds:schemaRef ds:uri="http://schemas.microsoft.com/sharepoint/v3/contenttype/forms"/>
   </ds:schemaRefs>
 </ds:datastoreItem>
 </file>
</xml_diff>